<commit_message>
Added images to videos 3-7
</commit_message>
<xml_diff>
--- a/src/video-03-literature-review.pptx
+++ b/src/video-03-literature-review.pptx
@@ -14,6 +14,13 @@
     <p:sldId id="262" r:id="rId8"/>
     <p:sldId id="263" r:id="rId9"/>
     <p:sldId id="264" r:id="rId10"/>
+    <p:sldId id="265" r:id="rId11"/>
+    <p:sldId id="266" r:id="rId12"/>
+    <p:sldId id="267" r:id="rId13"/>
+    <p:sldId id="268" r:id="rId14"/>
+    <p:sldId id="269" r:id="rId15"/>
+    <p:sldId id="270" r:id="rId16"/>
+    <p:sldId id="271" r:id="rId17"/>
   </p:sldIdLst>
   <p:sldSz cx="9144000" cy="6858000" type="screen4x3"/>
   <p:notesSz cx="6858000" cy="9144000"/>
@@ -3205,6 +3212,598 @@
 </p:sld>
 </file>
 
+<file path=ppt/slides/slide10.xml><?xml version="1.0" encoding="utf-8"?>
+<p:sld xmlns:a="http://schemas.openxmlformats.org/drawingml/2006/main" xmlns:r="http://schemas.openxmlformats.org/officeDocument/2006/relationships" xmlns:p="http://schemas.openxmlformats.org/presentationml/2006/main">
+  <p:cSld>
+    <p:spTree>
+      <p:nvGrpSpPr>
+        <p:cNvPr id="1" name=""/>
+        <p:cNvGrpSpPr/>
+        <p:nvPr/>
+      </p:nvGrpSpPr>
+      <p:grpSpPr>
+        <a:xfrm>
+          <a:off x="0" y="0"/>
+          <a:ext cx="0" cy="0"/>
+          <a:chOff x="0" y="0"/>
+          <a:chExt cx="0" cy="0"/>
+        </a:xfrm>
+      </p:grpSpPr>
+      <p:sp>
+        <p:nvSpPr>
+          <p:cNvPr id="2" name="Title 1"/>
+          <p:cNvSpPr>
+            <a:spLocks noGrp="1"/>
+          </p:cNvSpPr>
+          <p:nvPr>
+            <p:ph type="title"/>
+          </p:nvPr>
+        </p:nvSpPr>
+        <p:spPr/>
+        <p:txBody>
+          <a:bodyPr/>
+          <a:lstStyle/>
+          <a:p>
+            <a:pPr lvl="0" marL="0" indent="0">
+              <a:buNone/>
+            </a:pPr>
+            <a:r>
+              <a:rPr/>
+              <a:t>Evaluating</a:t>
+            </a:r>
+            <a:r>
+              <a:rPr/>
+              <a:t> </a:t>
+            </a:r>
+            <a:r>
+              <a:rPr/>
+              <a:t>Research</a:t>
+            </a:r>
+            <a:r>
+              <a:rPr/>
+              <a:t> </a:t>
+            </a:r>
+            <a:r>
+              <a:rPr/>
+              <a:t>Validity</a:t>
+            </a:r>
+          </a:p>
+        </p:txBody>
+      </p:sp>
+      <p:sp>
+        <p:nvSpPr>
+          <p:cNvPr id="3" name="Content Placeholder 2"/>
+          <p:cNvSpPr>
+            <a:spLocks noGrp="1"/>
+          </p:cNvSpPr>
+          <p:nvPr>
+            <p:ph idx="1"/>
+          </p:nvPr>
+        </p:nvSpPr>
+        <p:spPr/>
+        <p:txBody>
+          <a:bodyPr/>
+          <a:lstStyle/>
+          <a:p>
+            <a:pPr lvl="1"/>
+            <a:r>
+              <a:rPr/>
+              <a:t>GM&amp;L framework document</a:t>
+            </a:r>
+          </a:p>
+        </p:txBody>
+      </p:sp>
+    </p:spTree>
+  </p:cSld>
+</p:sld>
+</file>
+
+<file path=ppt/slides/slide11.xml><?xml version="1.0" encoding="utf-8"?>
+<p:sld xmlns:a="http://schemas.openxmlformats.org/drawingml/2006/main" xmlns:r="http://schemas.openxmlformats.org/officeDocument/2006/relationships" xmlns:p="http://schemas.openxmlformats.org/presentationml/2006/main">
+  <p:cSld>
+    <p:spTree>
+      <p:nvGrpSpPr>
+        <p:cNvPr id="1" name=""/>
+        <p:cNvGrpSpPr/>
+        <p:nvPr/>
+      </p:nvGrpSpPr>
+      <p:grpSpPr>
+        <a:xfrm>
+          <a:off x="0" y="0"/>
+          <a:ext cx="0" cy="0"/>
+          <a:chOff x="0" y="0"/>
+          <a:chExt cx="0" cy="0"/>
+        </a:xfrm>
+      </p:grpSpPr>
+      <p:sp>
+        <p:nvSpPr>
+          <p:cNvPr id="2" name="Title 1"/>
+          <p:cNvSpPr>
+            <a:spLocks noGrp="1"/>
+          </p:cNvSpPr>
+          <p:nvPr>
+            <p:ph type="title"/>
+          </p:nvPr>
+        </p:nvSpPr>
+        <p:spPr/>
+        <p:txBody>
+          <a:bodyPr/>
+          <a:lstStyle/>
+          <a:p>
+            <a:pPr lvl="0" marL="0" indent="0">
+              <a:buNone/>
+            </a:pPr>
+            <a:r>
+              <a:rPr/>
+              <a:t>Evaluating</a:t>
+            </a:r>
+            <a:r>
+              <a:rPr/>
+              <a:t> </a:t>
+            </a:r>
+            <a:r>
+              <a:rPr/>
+              <a:t>Research</a:t>
+            </a:r>
+            <a:r>
+              <a:rPr/>
+              <a:t> </a:t>
+            </a:r>
+            <a:r>
+              <a:rPr/>
+              <a:t>Reports</a:t>
+            </a:r>
+          </a:p>
+        </p:txBody>
+      </p:sp>
+      <p:sp>
+        <p:nvSpPr>
+          <p:cNvPr id="3" name="Content Placeholder 2"/>
+          <p:cNvSpPr>
+            <a:spLocks noGrp="1"/>
+          </p:cNvSpPr>
+          <p:nvPr>
+            <p:ph idx="1"/>
+          </p:nvPr>
+        </p:nvSpPr>
+        <p:spPr/>
+        <p:txBody>
+          <a:bodyPr/>
+          <a:lstStyle/>
+          <a:p>
+            <a:pPr lvl="0" marL="0" indent="0">
+              <a:buNone/>
+            </a:pPr>
+            <a:r>
+              <a:rPr/>
+              <a:t>Portney &amp; Watkins, 2009 </a:t>
+            </a:r>
+          </a:p>
+        </p:txBody>
+      </p:sp>
+    </p:spTree>
+  </p:cSld>
+</p:sld>
+</file>
+
+<file path=ppt/slides/slide12.xml><?xml version="1.0" encoding="utf-8"?>
+<p:sld xmlns:a="http://schemas.openxmlformats.org/drawingml/2006/main" xmlns:r="http://schemas.openxmlformats.org/officeDocument/2006/relationships" xmlns:p="http://schemas.openxmlformats.org/presentationml/2006/main">
+  <p:cSld>
+    <p:spTree>
+      <p:nvGrpSpPr>
+        <p:cNvPr id="1" name=""/>
+        <p:cNvGrpSpPr/>
+        <p:nvPr/>
+      </p:nvGrpSpPr>
+      <p:grpSpPr>
+        <a:xfrm>
+          <a:off x="0" y="0"/>
+          <a:ext cx="0" cy="0"/>
+          <a:chOff x="0" y="0"/>
+          <a:chExt cx="0" cy="0"/>
+        </a:xfrm>
+      </p:grpSpPr>
+      <p:sp>
+        <p:nvSpPr>
+          <p:cNvPr id="2" name="Title 1"/>
+          <p:cNvSpPr>
+            <a:spLocks noGrp="1"/>
+          </p:cNvSpPr>
+          <p:nvPr>
+            <p:ph type="title"/>
+          </p:nvPr>
+        </p:nvSpPr>
+        <p:spPr/>
+        <p:txBody>
+          <a:bodyPr/>
+          <a:lstStyle/>
+          <a:p>
+            <a:pPr lvl="0" marL="0" indent="0">
+              <a:buNone/>
+            </a:pPr>
+            <a:r>
+              <a:rPr/>
+              <a:t>Evaluating</a:t>
+            </a:r>
+            <a:r>
+              <a:rPr/>
+              <a:t> </a:t>
+            </a:r>
+            <a:r>
+              <a:rPr/>
+              <a:t>Research</a:t>
+            </a:r>
+            <a:r>
+              <a:rPr/>
+              <a:t> </a:t>
+            </a:r>
+            <a:r>
+              <a:rPr/>
+              <a:t>Validity</a:t>
+            </a:r>
+          </a:p>
+        </p:txBody>
+      </p:sp>
+      <p:sp>
+        <p:nvSpPr>
+          <p:cNvPr id="3" name="Content Placeholder 2"/>
+          <p:cNvSpPr>
+            <a:spLocks noGrp="1"/>
+          </p:cNvSpPr>
+          <p:nvPr>
+            <p:ph idx="1"/>
+          </p:nvPr>
+        </p:nvSpPr>
+        <p:spPr/>
+        <p:txBody>
+          <a:bodyPr/>
+          <a:lstStyle/>
+          <a:p>
+            <a:pPr lvl="1"/>
+            <a:r>
+              <a:rPr/>
+              <a:t>Other Options - examples</a:t>
+            </a:r>
+          </a:p>
+          <a:p>
+            <a:pPr lvl="2"/>
+            <a:r>
+              <a:rPr/>
+              <a:t>MEDB 5511 Literature review form</a:t>
+            </a:r>
+          </a:p>
+          <a:p>
+            <a:pPr lvl="2"/>
+            <a:r>
+              <a:rPr/>
+              <a:t>MEDB 5511 .xls template</a:t>
+            </a:r>
+          </a:p>
+          <a:p>
+            <a:pPr lvl="2"/>
+            <a:r>
+              <a:rPr/>
+              <a:t>Proposal literature review file</a:t>
+            </a:r>
+          </a:p>
+        </p:txBody>
+      </p:sp>
+    </p:spTree>
+  </p:cSld>
+</p:sld>
+</file>
+
+<file path=ppt/slides/slide13.xml><?xml version="1.0" encoding="utf-8"?>
+<p:sld xmlns:a="http://schemas.openxmlformats.org/drawingml/2006/main" xmlns:r="http://schemas.openxmlformats.org/officeDocument/2006/relationships" xmlns:p="http://schemas.openxmlformats.org/presentationml/2006/main">
+  <p:cSld>
+    <p:spTree>
+      <p:nvGrpSpPr>
+        <p:cNvPr id="1" name=""/>
+        <p:cNvGrpSpPr/>
+        <p:nvPr/>
+      </p:nvGrpSpPr>
+      <p:grpSpPr>
+        <a:xfrm>
+          <a:off x="0" y="0"/>
+          <a:ext cx="0" cy="0"/>
+          <a:chOff x="0" y="0"/>
+          <a:chExt cx="0" cy="0"/>
+        </a:xfrm>
+      </p:grpSpPr>
+      <p:sp>
+        <p:nvSpPr>
+          <p:cNvPr id="2" name="Title 1"/>
+          <p:cNvSpPr>
+            <a:spLocks noGrp="1"/>
+          </p:cNvSpPr>
+          <p:nvPr>
+            <p:ph type="title"/>
+          </p:nvPr>
+        </p:nvSpPr>
+        <p:spPr/>
+        <p:txBody>
+          <a:bodyPr/>
+          <a:lstStyle/>
+          <a:p>
+            <a:pPr lvl="0" marL="0" indent="0">
+              <a:buNone/>
+            </a:pPr>
+            <a:r>
+              <a:rPr/>
+              <a:t>Assignment</a:t>
+            </a:r>
+          </a:p>
+        </p:txBody>
+      </p:sp>
+      <p:sp>
+        <p:nvSpPr>
+          <p:cNvPr id="3" name="Content Placeholder 2"/>
+          <p:cNvSpPr>
+            <a:spLocks noGrp="1"/>
+          </p:cNvSpPr>
+          <p:nvPr>
+            <p:ph idx="1"/>
+          </p:nvPr>
+        </p:nvSpPr>
+        <p:spPr/>
+        <p:txBody>
+          <a:bodyPr/>
+          <a:lstStyle/>
+          <a:p>
+            <a:pPr lvl="1"/>
+            <a:r>
+              <a:rPr/>
+              <a:t>Nothing to be turned in next week</a:t>
+            </a:r>
+          </a:p>
+          <a:p>
+            <a:pPr lvl="1"/>
+            <a:r>
+              <a:rPr/>
+              <a:t>Work on identifying a research topic you want to work on for the final project .</a:t>
+            </a:r>
+          </a:p>
+        </p:txBody>
+      </p:sp>
+    </p:spTree>
+  </p:cSld>
+</p:sld>
+</file>
+
+<file path=ppt/slides/slide14.xml><?xml version="1.0" encoding="utf-8"?>
+<p:sld xmlns:a="http://schemas.openxmlformats.org/drawingml/2006/main" xmlns:r="http://schemas.openxmlformats.org/officeDocument/2006/relationships" xmlns:p="http://schemas.openxmlformats.org/presentationml/2006/main">
+  <p:cSld>
+    <p:spTree>
+      <p:nvGrpSpPr>
+        <p:cNvPr id="1" name=""/>
+        <p:cNvGrpSpPr/>
+        <p:nvPr/>
+      </p:nvGrpSpPr>
+      <p:grpSpPr>
+        <a:xfrm>
+          <a:off x="0" y="0"/>
+          <a:ext cx="0" cy="0"/>
+          <a:chOff x="0" y="0"/>
+          <a:chExt cx="0" cy="0"/>
+        </a:xfrm>
+      </p:grpSpPr>
+      <p:sp>
+        <p:nvSpPr>
+          <p:cNvPr id="2" name="Title 1"/>
+          <p:cNvSpPr>
+            <a:spLocks noGrp="1"/>
+          </p:cNvSpPr>
+          <p:nvPr>
+            <p:ph type="title"/>
+          </p:nvPr>
+        </p:nvSpPr>
+        <p:spPr/>
+        <p:txBody>
+          <a:bodyPr/>
+          <a:lstStyle/>
+          <a:p>
+            <a:pPr lvl="0" marL="0" indent="0">
+              <a:buNone/>
+            </a:pPr>
+            <a:r>
+              <a:rPr/>
+              <a:t>Assignment</a:t>
+            </a:r>
+          </a:p>
+        </p:txBody>
+      </p:sp>
+      <p:sp>
+        <p:nvSpPr>
+          <p:cNvPr id="3" name="Content Placeholder 2"/>
+          <p:cNvSpPr>
+            <a:spLocks noGrp="1"/>
+          </p:cNvSpPr>
+          <p:nvPr>
+            <p:ph idx="1"/>
+          </p:nvPr>
+        </p:nvSpPr>
+        <p:spPr/>
+        <p:txBody>
+          <a:bodyPr/>
+          <a:lstStyle/>
+          <a:p>
+            <a:pPr lvl="1">
+              <a:buAutoNum type="arabicPeriod"/>
+            </a:pPr>
+            <a:r>
+              <a:rPr/>
+              <a:t>Work on the literature search for your research project idea</a:t>
+            </a:r>
+          </a:p>
+          <a:p>
+            <a:pPr lvl="1">
+              <a:buAutoNum type="arabicPeriod"/>
+            </a:pPr>
+            <a:r>
+              <a:rPr/>
+              <a:t>Prepare for next weekâ€™s session</a:t>
+            </a:r>
+          </a:p>
+        </p:txBody>
+      </p:sp>
+    </p:spTree>
+  </p:cSld>
+</p:sld>
+</file>
+
+<file path=ppt/slides/slide15.xml><?xml version="1.0" encoding="utf-8"?>
+<p:sld xmlns:a="http://schemas.openxmlformats.org/drawingml/2006/main" xmlns:r="http://schemas.openxmlformats.org/officeDocument/2006/relationships" xmlns:p="http://schemas.openxmlformats.org/presentationml/2006/main">
+  <p:cSld>
+    <p:spTree>
+      <p:nvGrpSpPr>
+        <p:cNvPr id="1" name=""/>
+        <p:cNvGrpSpPr/>
+        <p:nvPr/>
+      </p:nvGrpSpPr>
+      <p:grpSpPr>
+        <a:xfrm>
+          <a:off x="0" y="0"/>
+          <a:ext cx="0" cy="0"/>
+          <a:chOff x="0" y="0"/>
+          <a:chExt cx="0" cy="0"/>
+        </a:xfrm>
+      </p:grpSpPr>
+      <p:sp>
+        <p:nvSpPr>
+          <p:cNvPr id="2" name="Title 1"/>
+          <p:cNvSpPr>
+            <a:spLocks noGrp="1"/>
+          </p:cNvSpPr>
+          <p:nvPr>
+            <p:ph type="title"/>
+          </p:nvPr>
+        </p:nvSpPr>
+        <p:spPr/>
+        <p:txBody>
+          <a:bodyPr/>
+          <a:lstStyle/>
+          <a:p>
+            <a:pPr lvl="0" marL="0" indent="0">
+              <a:buNone/>
+            </a:pPr>
+            <a:r>
+              <a:rPr/>
+              <a:t>Discussion</a:t>
+            </a:r>
+            <a:r>
+              <a:rPr/>
+              <a:t> </a:t>
+            </a:r>
+            <a:r>
+              <a:rPr/>
+              <a:t>questions</a:t>
+            </a:r>
+          </a:p>
+        </p:txBody>
+      </p:sp>
+      <p:sp>
+        <p:nvSpPr>
+          <p:cNvPr id="3" name="Content Placeholder 2"/>
+          <p:cNvSpPr>
+            <a:spLocks noGrp="1"/>
+          </p:cNvSpPr>
+          <p:nvPr>
+            <p:ph idx="1"/>
+          </p:nvPr>
+        </p:nvSpPr>
+        <p:spPr/>
+        <p:txBody>
+          <a:bodyPr/>
+          <a:lstStyle/>
+          <a:p>
+            <a:pPr lvl="1">
+              <a:buAutoNum type="arabicPeriod"/>
+            </a:pPr>
+            <a:r>
+              <a:rPr/>
+              <a:t>How will the library resources contribute to your research activity?</a:t>
+            </a:r>
+          </a:p>
+          <a:p>
+            <a:pPr lvl="1">
+              <a:buAutoNum type="arabicPeriod"/>
+            </a:pPr>
+            <a:r>
+              <a:rPr/>
+              <a:t>What kinds of information will you be compiling from the literature you will be reviewing for your proposal?</a:t>
+            </a:r>
+          </a:p>
+          <a:p>
+            <a:pPr lvl="1">
+              <a:buAutoNum type="arabicPeriod"/>
+            </a:pPr>
+            <a:r>
+              <a:rPr/>
+              <a:t>How do you usually organize information when reviewing literature?</a:t>
+            </a:r>
+          </a:p>
+        </p:txBody>
+      </p:sp>
+    </p:spTree>
+  </p:cSld>
+</p:sld>
+</file>
+
+<file path=ppt/slides/slide16.xml><?xml version="1.0" encoding="utf-8"?>
+<p:sld xmlns:a="http://schemas.openxmlformats.org/drawingml/2006/main" xmlns:r="http://schemas.openxmlformats.org/officeDocument/2006/relationships" xmlns:p="http://schemas.openxmlformats.org/presentationml/2006/main">
+  <p:cSld>
+    <p:spTree>
+      <p:nvGrpSpPr>
+        <p:cNvPr id="1" name=""/>
+        <p:cNvGrpSpPr/>
+        <p:nvPr/>
+      </p:nvGrpSpPr>
+      <p:grpSpPr>
+        <a:xfrm>
+          <a:off x="0" y="0"/>
+          <a:ext cx="0" cy="0"/>
+          <a:chOff x="0" y="0"/>
+          <a:chExt cx="0" cy="0"/>
+        </a:xfrm>
+      </p:grpSpPr>
+      <p:sp>
+        <p:nvSpPr>
+          <p:cNvPr id="2" name="Title 1"/>
+          <p:cNvSpPr>
+            <a:spLocks noGrp="1"/>
+          </p:cNvSpPr>
+          <p:nvPr>
+            <p:ph type="title"/>
+          </p:nvPr>
+        </p:nvSpPr>
+        <p:spPr/>
+        <p:txBody>
+          <a:bodyPr/>
+          <a:lstStyle/>
+          <a:p>
+            <a:pPr lvl="0" marL="0" indent="0">
+              <a:buNone/>
+            </a:pPr>
+            <a:r>
+              <a:rPr/>
+              <a:t>Additional</a:t>
+            </a:r>
+            <a:r>
+              <a:rPr/>
+              <a:t> </a:t>
+            </a:r>
+            <a:r>
+              <a:rPr/>
+              <a:t>slides</a:t>
+            </a:r>
+          </a:p>
+        </p:txBody>
+      </p:sp>
+    </p:spTree>
+  </p:cSld>
+</p:sld>
+</file>
+
 <file path=ppt/slides/slide2.xml><?xml version="1.0" encoding="utf-8"?>
 <p:sld xmlns:a="http://schemas.openxmlformats.org/drawingml/2006/main" xmlns:r="http://schemas.openxmlformats.org/officeDocument/2006/relationships" xmlns:p="http://schemas.openxmlformats.org/presentationml/2006/main">
   <p:cSld>
@@ -3410,12 +4009,7 @@
             <p:ph type="title"/>
           </p:nvPr>
         </p:nvSpPr>
-        <p:spPr>
-          <a:xfrm>
-            <a:off x="722313" y="4406900"/>
-            <a:ext cx="7772400" cy="1362075"/>
-          </a:xfrm>
-        </p:spPr>
+        <p:spPr/>
         <p:txBody>
           <a:bodyPr/>
           <a:lstStyle/>
@@ -3434,6 +4028,44 @@
             <a:r>
               <a:rPr/>
               <a:t>Reviews</a:t>
+            </a:r>
+          </a:p>
+        </p:txBody>
+      </p:sp>
+      <p:sp>
+        <p:nvSpPr>
+          <p:cNvPr id="3" name="Content Placeholder 2"/>
+          <p:cNvSpPr>
+            <a:spLocks noGrp="1"/>
+          </p:cNvSpPr>
+          <p:nvPr>
+            <p:ph idx="1"/>
+          </p:nvPr>
+        </p:nvSpPr>
+        <p:spPr/>
+        <p:txBody>
+          <a:bodyPr/>
+          <a:lstStyle/>
+          <a:p>
+            <a:pPr lvl="1"/>
+            <a:r>
+              <a:rPr/>
+              <a:t>Additional Resources</a:t>
+            </a:r>
+          </a:p>
+          <a:p>
+            <a:pPr lvl="2"/>
+            <a:r>
+              <a:rPr/>
+              <a:t>L.G. Portney &amp; M.P. Watkins. Chapter 34, ?Evaluating research reports.? </a:t>
+            </a:r>
+            <a:r>
+              <a:rPr i="1"/>
+              <a:t>Foundations of Clinical Research: Applications to Practice, 3rd ed.</a:t>
+            </a:r>
+            <a:r>
+              <a:rPr/>
+              <a:t> Upper Saddle River, New Jersey: Pearson Prentice Hall.</a:t>
             </a:r>
           </a:p>
         </p:txBody>
@@ -3462,6 +4094,39 @@
       </p:grpSpPr>
       <p:sp>
         <p:nvSpPr>
+          <p:cNvPr id="2" name="Title 1"/>
+          <p:cNvSpPr>
+            <a:spLocks noGrp="1"/>
+          </p:cNvSpPr>
+          <p:nvPr>
+            <p:ph type="title"/>
+          </p:nvPr>
+        </p:nvSpPr>
+        <p:spPr/>
+        <p:txBody>
+          <a:bodyPr/>
+          <a:lstStyle/>
+          <a:p>
+            <a:pPr lvl="0" marL="0" indent="0">
+              <a:buNone/>
+            </a:pPr>
+            <a:r>
+              <a:rPr/>
+              <a:t>Literature</a:t>
+            </a:r>
+            <a:r>
+              <a:rPr/>
+              <a:t> </a:t>
+            </a:r>
+            <a:r>
+              <a:rPr/>
+              <a:t>Reviews</a:t>
+            </a:r>
+          </a:p>
+        </p:txBody>
+      </p:sp>
+      <p:sp>
+        <p:nvSpPr>
           <p:cNvPr id="3" name="Content Placeholder 2"/>
           <p:cNvSpPr>
             <a:spLocks noGrp="1"/>
@@ -3478,227 +4143,35 @@
             <a:pPr lvl="1"/>
             <a:r>
               <a:rPr/>
-              <a:t>Additional Resources</a:t>
-            </a:r>
-          </a:p>
-          <a:p>
-            <a:pPr lvl="2"/>
-            <a:r>
-              <a:rPr/>
-              <a:t>L.G. Portney &amp; M.P. Watkins. Chapter 34, ?Evaluating research reports.? </a:t>
-            </a:r>
-            <a:r>
-              <a:rPr i="1"/>
-              <a:t>Foundations of Clinical Research: Applications to Practice, 3rd ed.</a:t>
-            </a:r>
-            <a:r>
-              <a:rPr/>
-              <a:t> Upper Saddle River, New Jersey: Pearson Prentice Hall. *** # Literature Reviews</a:t>
+              <a:t>Step 2 ? Conduct literature review</a:t>
             </a:r>
           </a:p>
           <a:p>
             <a:pPr lvl="1"/>
             <a:r>
               <a:rPr/>
-              <a:t>Step 2 ? Conduct literature review</a:t>
+              <a:t>Purposes of literature review</a:t>
             </a:r>
           </a:p>
           <a:p>
             <a:pPr lvl="1"/>
             <a:r>
               <a:rPr/>
-              <a:t>Purposes of literature review</a:t>
+              <a:t>What a literature review is ?</a:t>
             </a:r>
           </a:p>
           <a:p>
             <a:pPr lvl="1"/>
             <a:r>
               <a:rPr/>
-              <a:t>What a literature review is ?</a:t>
+              <a:t>What a literature review is NOT ?</a:t>
             </a:r>
           </a:p>
           <a:p>
             <a:pPr lvl="1"/>
             <a:r>
               <a:rPr/>
-              <a:t>What a literature review is NOT ?</a:t>
-            </a:r>
-          </a:p>
-          <a:p>
-            <a:pPr lvl="1"/>
-            <a:r>
-              <a:rPr/>
-              <a:t>Sources to be used in literature review *** # Literature Reviews</a:t>
-            </a:r>
-          </a:p>
-          <a:p>
-            <a:pPr lvl="1"/>
-            <a:r>
-              <a:rPr/>
-              <a:t>Reviewing the literature</a:t>
-            </a:r>
-          </a:p>
-          <a:p>
-            <a:pPr lvl="2"/>
-            <a:r>
-              <a:rPr/>
-              <a:t>What is known</a:t>
-            </a:r>
-          </a:p>
-          <a:p>
-            <a:pPr lvl="2"/>
-            <a:r>
-              <a:rPr/>
-              <a:t>What questions remain</a:t>
-            </a:r>
-          </a:p>
-          <a:p>
-            <a:pPr lvl="2"/>
-            <a:r>
-              <a:rPr/>
-              <a:t>Evaluating research reports</a:t>
-            </a:r>
-          </a:p>
-          <a:p>
-            <a:pPr lvl="3"/>
-            <a:r>
-              <a:rPr/>
-              <a:t>Journal quality</a:t>
-            </a:r>
-          </a:p>
-          <a:p>
-            <a:pPr lvl="3"/>
-            <a:r>
-              <a:rPr/>
-              <a:t>What is the study about?</a:t>
-            </a:r>
-          </a:p>
-          <a:p>
-            <a:pPr lvl="3"/>
-            <a:r>
-              <a:rPr/>
-              <a:t>Are the results of the study valid?</a:t>
-            </a:r>
-          </a:p>
-          <a:p>
-            <a:pPr lvl="3"/>
-            <a:r>
-              <a:rPr/>
-              <a:t>Are the results meaningful?</a:t>
-            </a:r>
-          </a:p>
-          <a:p>
-            <a:pPr lvl="3"/>
-            <a:r>
-              <a:rPr/>
-              <a:t>What does it all mean and how does it contribute to what you want to do? *** # Evaluating Research Validity</a:t>
-            </a:r>
-          </a:p>
-          <a:p>
-            <a:pPr lvl="1"/>
-            <a:r>
-              <a:rPr/>
-              <a:t>Evaluation of the quality of the design and analysis of a study</a:t>
-            </a:r>
-          </a:p>
-          <a:p>
-            <a:pPr lvl="1"/>
-            <a:r>
-              <a:rPr/>
-              <a:t>GM&amp;L framework ?</a:t>
-            </a:r>
-          </a:p>
-          <a:p>
-            <a:pPr lvl="2"/>
-            <a:r>
-              <a:rPr/>
-              <a:t>designed to be used with both experimental and non-experimental research</a:t>
-            </a:r>
-          </a:p>
-          <a:p>
-            <a:pPr lvl="1"/>
-            <a:r>
-              <a:rPr/>
-              <a:t>Assess research validity</a:t>
-            </a:r>
-          </a:p>
-          <a:p>
-            <a:pPr lvl="2"/>
-            <a:r>
-              <a:rPr/>
-              <a:t>Series of continua</a:t>
-            </a:r>
-          </a:p>
-          <a:p>
-            <a:pPr lvl="1"/>
-            <a:r>
-              <a:rPr/>
-              <a:t>Emphasis on methods and results *** # Evaluating Research Validity</a:t>
-            </a:r>
-          </a:p>
-          <a:p>
-            <a:pPr lvl="1"/>
-            <a:r>
-              <a:rPr/>
-              <a:t>GM&amp;L framework ?</a:t>
-            </a:r>
-          </a:p>
-          <a:p>
-            <a:pPr lvl="2"/>
-            <a:r>
-              <a:rPr/>
-              <a:t>19 questions</a:t>
-            </a:r>
-          </a:p>
-          <a:p>
-            <a:pPr lvl="2"/>
-            <a:r>
-              <a:rPr/>
-              <a:t>8 rating scales</a:t>
-            </a:r>
-          </a:p>
-          <a:p>
-            <a:pPr lvl="1"/>
-            <a:r>
-              <a:rPr/>
-              <a:t>19 questions &lt;U+F0E8&gt; 3 main groups</a:t>
-            </a:r>
-          </a:p>
-          <a:p>
-            <a:pPr lvl="2"/>
-            <a:r>
-              <a:rPr/>
-              <a:t>Key aspects of the design and methods (1 ? 8)</a:t>
-            </a:r>
-          </a:p>
-          <a:p>
-            <a:pPr lvl="2"/>
-            <a:r>
-              <a:rPr/>
-              <a:t>Evaluative ratings (9 ? 16)</a:t>
-            </a:r>
-          </a:p>
-          <a:p>
-            <a:pPr lvl="2"/>
-            <a:r>
-              <a:rPr/>
-              <a:t>General evaluation questions (17 ? 19)</a:t>
-            </a:r>
-          </a:p>
-          <a:p>
-            <a:pPr lvl="1"/>
-            <a:r>
-              <a:rPr/>
-              <a:t>?? merit or worth of the study as a whole?? *** # Evaluating Research Validity</a:t>
-            </a:r>
-          </a:p>
-          <a:p>
-            <a:pPr lvl="0" marL="0" indent="0">
-              <a:buNone/>
-            </a:pPr>
-            <a:r>
-              <a:rPr/>
-              <a:t>(assets/img/image1.png)</a:t>
+              <a:t>Sources to be used in literature review</a:t>
             </a:r>
           </a:p>
         </p:txBody>
@@ -3735,12 +4208,7 @@
             <p:ph type="title"/>
           </p:nvPr>
         </p:nvSpPr>
-        <p:spPr>
-          <a:xfrm>
-            <a:off x="722313" y="4406900"/>
-            <a:ext cx="7772400" cy="1362075"/>
-          </a:xfrm>
-        </p:spPr>
+        <p:spPr/>
         <p:txBody>
           <a:bodyPr/>
           <a:lstStyle/>
@@ -3750,7 +4218,7 @@
             </a:pPr>
             <a:r>
               <a:rPr/>
-              <a:t>Evaluating</a:t>
+              <a:t>Literature</a:t>
             </a:r>
             <a:r>
               <a:rPr/>
@@ -3758,15 +4226,86 @@
             </a:r>
             <a:r>
               <a:rPr/>
-              <a:t>Research</a:t>
-            </a:r>
-            <a:r>
-              <a:rPr/>
-              <a:t> </a:t>
-            </a:r>
-            <a:r>
-              <a:rPr/>
-              <a:t>Validity</a:t>
+              <a:t>Reviews</a:t>
+            </a:r>
+          </a:p>
+        </p:txBody>
+      </p:sp>
+      <p:sp>
+        <p:nvSpPr>
+          <p:cNvPr id="3" name="Content Placeholder 2"/>
+          <p:cNvSpPr>
+            <a:spLocks noGrp="1"/>
+          </p:cNvSpPr>
+          <p:nvPr>
+            <p:ph idx="1"/>
+          </p:nvPr>
+        </p:nvSpPr>
+        <p:spPr/>
+        <p:txBody>
+          <a:bodyPr/>
+          <a:lstStyle/>
+          <a:p>
+            <a:pPr lvl="1"/>
+            <a:r>
+              <a:rPr/>
+              <a:t>Reviewing the literature</a:t>
+            </a:r>
+          </a:p>
+          <a:p>
+            <a:pPr lvl="2"/>
+            <a:r>
+              <a:rPr/>
+              <a:t>What is known</a:t>
+            </a:r>
+          </a:p>
+          <a:p>
+            <a:pPr lvl="2"/>
+            <a:r>
+              <a:rPr/>
+              <a:t>What questions remain</a:t>
+            </a:r>
+          </a:p>
+          <a:p>
+            <a:pPr lvl="2"/>
+            <a:r>
+              <a:rPr/>
+              <a:t>Evaluating research reports</a:t>
+            </a:r>
+          </a:p>
+          <a:p>
+            <a:pPr lvl="3"/>
+            <a:r>
+              <a:rPr/>
+              <a:t>Journal quality</a:t>
+            </a:r>
+          </a:p>
+          <a:p>
+            <a:pPr lvl="3"/>
+            <a:r>
+              <a:rPr/>
+              <a:t>What is the study about?</a:t>
+            </a:r>
+          </a:p>
+          <a:p>
+            <a:pPr lvl="3"/>
+            <a:r>
+              <a:rPr/>
+              <a:t>Are the results of the study valid?</a:t>
+            </a:r>
+          </a:p>
+          <a:p>
+            <a:pPr lvl="3"/>
+            <a:r>
+              <a:rPr/>
+              <a:t>Are the results meaningful?</a:t>
+            </a:r>
+          </a:p>
+          <a:p>
+            <a:pPr lvl="3"/>
+            <a:r>
+              <a:rPr/>
+              <a:t>What does it all mean and how does it contribute to what you want to do?</a:t>
             </a:r>
           </a:p>
         </p:txBody>
@@ -3795,6 +4334,47 @@
       </p:grpSpPr>
       <p:sp>
         <p:nvSpPr>
+          <p:cNvPr id="2" name="Title 1"/>
+          <p:cNvSpPr>
+            <a:spLocks noGrp="1"/>
+          </p:cNvSpPr>
+          <p:nvPr>
+            <p:ph type="title"/>
+          </p:nvPr>
+        </p:nvSpPr>
+        <p:spPr/>
+        <p:txBody>
+          <a:bodyPr/>
+          <a:lstStyle/>
+          <a:p>
+            <a:pPr lvl="0" marL="0" indent="0">
+              <a:buNone/>
+            </a:pPr>
+            <a:r>
+              <a:rPr/>
+              <a:t>Evaluating</a:t>
+            </a:r>
+            <a:r>
+              <a:rPr/>
+              <a:t> </a:t>
+            </a:r>
+            <a:r>
+              <a:rPr/>
+              <a:t>Research</a:t>
+            </a:r>
+            <a:r>
+              <a:rPr/>
+              <a:t> </a:t>
+            </a:r>
+            <a:r>
+              <a:rPr/>
+              <a:t>Validity</a:t>
+            </a:r>
+          </a:p>
+        </p:txBody>
+      </p:sp>
+      <p:sp>
+        <p:nvSpPr>
           <p:cNvPr id="3" name="Content Placeholder 2"/>
           <p:cNvSpPr>
             <a:spLocks noGrp="1"/>
@@ -3811,76 +4391,42 @@
             <a:pPr lvl="1"/>
             <a:r>
               <a:rPr/>
-              <a:t>GM&amp;L fram ework document *** # Evaluating Research Reports</a:t>
-            </a:r>
-          </a:p>
-          <a:p>
-            <a:pPr lvl="0" marL="0" indent="0">
-              <a:buNone/>
-            </a:pPr>
-            <a:r>
-              <a:rPr/>
-              <a:t>Portney &amp; Watkins, 2009 assets/img/image2.png) *** # Evaluating Research Validity</a:t>
+              <a:t>Evaluation of the quality of the design and analysis of a study</a:t>
             </a:r>
           </a:p>
           <a:p>
             <a:pPr lvl="1"/>
             <a:r>
               <a:rPr/>
-              <a:t>Other Options - examples</a:t>
+              <a:t>GM&amp;L framework ?</a:t>
             </a:r>
           </a:p>
           <a:p>
             <a:pPr lvl="2"/>
             <a:r>
               <a:rPr/>
-              <a:t>MEDB 5511 Literature review form</a:t>
+              <a:t>designed to be used with both experimental and non-experimental research</a:t>
+            </a:r>
+          </a:p>
+          <a:p>
+            <a:pPr lvl="1"/>
+            <a:r>
+              <a:rPr/>
+              <a:t>Assess research validity</a:t>
             </a:r>
           </a:p>
           <a:p>
             <a:pPr lvl="2"/>
             <a:r>
               <a:rPr/>
-              <a:t>MEDB 5511 .xls template</a:t>
-            </a:r>
-          </a:p>
-          <a:p>
-            <a:pPr lvl="2"/>
-            <a:r>
-              <a:rPr/>
-              <a:t>Proposal literature review file *** # Assignment</a:t>
+              <a:t>Series of continua</a:t>
             </a:r>
           </a:p>
           <a:p>
             <a:pPr lvl="1"/>
             <a:r>
               <a:rPr/>
-              <a:t>Nothing to be turned in next week</a:t>
-            </a:r>
-          </a:p>
-          <a:p>
-            <a:pPr lvl="1"/>
-            <a:r>
-              <a:rPr/>
-              <a:t>Work on identifying a research topic you want to work on for the final project . *** ### Assignment</a:t>
-            </a:r>
-          </a:p>
-          <a:p>
-            <a:pPr lvl="1">
-              <a:buAutoNum type="arabicPeriod"/>
-            </a:pPr>
-            <a:r>
-              <a:rPr/>
-              <a:t>Work on the literature search for your research project idea</a:t>
-            </a:r>
-          </a:p>
-          <a:p>
-            <a:pPr lvl="1">
-              <a:buAutoNum type="arabicPeriod"/>
-            </a:pPr>
-            <a:r>
-              <a:rPr/>
-              <a:t>Prepare for next weekâ€™s session</a:t>
+              <a:t>Emphasis on methods and results</a:t>
             </a:r>
           </a:p>
         </p:txBody>
@@ -3927,7 +4473,7 @@
             </a:pPr>
             <a:r>
               <a:rPr/>
-              <a:t>Discussion</a:t>
+              <a:t>Evaluating</a:t>
             </a:r>
             <a:r>
               <a:rPr/>
@@ -3935,7 +4481,15 @@
             </a:r>
             <a:r>
               <a:rPr/>
-              <a:t>questions</a:t>
+              <a:t>Research</a:t>
+            </a:r>
+            <a:r>
+              <a:rPr/>
+              <a:t> </a:t>
+            </a:r>
+            <a:r>
+              <a:rPr/>
+              <a:t>Validity</a:t>
             </a:r>
           </a:p>
         </p:txBody>
@@ -3955,30 +4509,59 @@
           <a:bodyPr/>
           <a:lstStyle/>
           <a:p>
-            <a:pPr lvl="1">
-              <a:buAutoNum type="arabicPeriod"/>
-            </a:pPr>
-            <a:r>
-              <a:rPr/>
-              <a:t>How will the library resources contribute to your research activity?</a:t>
-            </a:r>
-          </a:p>
-          <a:p>
-            <a:pPr lvl="1">
-              <a:buAutoNum type="arabicPeriod"/>
-            </a:pPr>
-            <a:r>
-              <a:rPr/>
-              <a:t>What kinds of information will you be compiling from the literature you will be reviewing for your proposal?</a:t>
-            </a:r>
-          </a:p>
-          <a:p>
-            <a:pPr lvl="1">
-              <a:buAutoNum type="arabicPeriod"/>
-            </a:pPr>
-            <a:r>
-              <a:rPr/>
-              <a:t>How do you usually organize information when reviewing literature?</a:t>
+            <a:pPr lvl="1"/>
+            <a:r>
+              <a:rPr/>
+              <a:t>GM&amp;L framework ?</a:t>
+            </a:r>
+          </a:p>
+          <a:p>
+            <a:pPr lvl="2"/>
+            <a:r>
+              <a:rPr/>
+              <a:t>19 questions</a:t>
+            </a:r>
+          </a:p>
+          <a:p>
+            <a:pPr lvl="2"/>
+            <a:r>
+              <a:rPr/>
+              <a:t>8 rating scales</a:t>
+            </a:r>
+          </a:p>
+          <a:p>
+            <a:pPr lvl="1"/>
+            <a:r>
+              <a:rPr/>
+              <a:t>19 questions &lt;U+F0E8&gt; 3 main groups</a:t>
+            </a:r>
+          </a:p>
+          <a:p>
+            <a:pPr lvl="2"/>
+            <a:r>
+              <a:rPr/>
+              <a:t>Key aspects of the design and methods (1 ? 8)</a:t>
+            </a:r>
+          </a:p>
+          <a:p>
+            <a:pPr lvl="2"/>
+            <a:r>
+              <a:rPr/>
+              <a:t>Evaluative ratings (9 ? 16)</a:t>
+            </a:r>
+          </a:p>
+          <a:p>
+            <a:pPr lvl="2"/>
+            <a:r>
+              <a:rPr/>
+              <a:t>General evaluation questions (17 ? 19)</a:t>
+            </a:r>
+          </a:p>
+          <a:p>
+            <a:pPr lvl="1"/>
+            <a:r>
+              <a:rPr/>
+              <a:t>?? merit or worth of the study as a whole??</a:t>
             </a:r>
           </a:p>
         </p:txBody>
@@ -4025,7 +4608,7 @@
             </a:pPr>
             <a:r>
               <a:rPr/>
-              <a:t>Additional</a:t>
+              <a:t>Evaluating</a:t>
             </a:r>
             <a:r>
               <a:rPr/>
@@ -4033,11 +4616,49 @@
             </a:r>
             <a:r>
               <a:rPr/>
-              <a:t>slides</a:t>
-            </a:r>
-          </a:p>
-        </p:txBody>
-      </p:sp>
+              <a:t>Research</a:t>
+            </a:r>
+            <a:r>
+              <a:rPr/>
+              <a:t> </a:t>
+            </a:r>
+            <a:r>
+              <a:rPr/>
+              <a:t>Validity</a:t>
+            </a:r>
+          </a:p>
+        </p:txBody>
+      </p:sp>
+      <p:pic>
+        <p:nvPicPr>
+          <p:cNvPr descr="../images/image-03-01.png" id="0" name="Picture 1"/>
+          <p:cNvPicPr>
+            <a:picLocks noGrp="1" noChangeAspect="1"/>
+          </p:cNvPicPr>
+          <p:nvPr/>
+        </p:nvPicPr>
+        <p:blipFill>
+          <a:blip r:embed="rId2"/>
+          <a:stretch>
+            <a:fillRect/>
+          </a:stretch>
+        </p:blipFill>
+        <p:spPr bwMode="auto">
+          <a:xfrm>
+            <a:off x="457200" y="1905000"/>
+            <a:ext cx="8229600" cy="3924300"/>
+          </a:xfrm>
+          <a:prstGeom prst="rect">
+            <a:avLst/>
+          </a:prstGeom>
+          <a:noFill/>
+          <a:ln w="9525">
+            <a:noFill/>
+            <a:headEnd/>
+            <a:tailEnd/>
+          </a:ln>
+        </p:spPr>
+      </p:pic>
     </p:spTree>
   </p:cSld>
 </p:sld>

</xml_diff>